<commit_message>
day 3, add Analysis_EdgeR_RNAseq.R
</commit_message>
<xml_diff>
--- a/powerpoints/RNA-seq-Piracicaba2015.pptx
+++ b/powerpoints/RNA-seq-Piracicaba2015.pptx
@@ -87,8 +87,8 @@
     <p:sldId id="349" r:id="rId81"/>
     <p:sldId id="350" r:id="rId82"/>
     <p:sldId id="351" r:id="rId83"/>
-    <p:sldId id="344" r:id="rId84"/>
-    <p:sldId id="352" r:id="rId85"/>
+    <p:sldId id="352" r:id="rId84"/>
+    <p:sldId id="344" r:id="rId85"/>
     <p:sldId id="342" r:id="rId86"/>
     <p:sldId id="325" r:id="rId87"/>
     <p:sldId id="326" r:id="rId88"/>
@@ -99,9 +99,11 @@
     <p:sldId id="343" r:id="rId93"/>
     <p:sldId id="327" r:id="rId94"/>
     <p:sldId id="328" r:id="rId95"/>
-    <p:sldId id="329" r:id="rId96"/>
-    <p:sldId id="330" r:id="rId97"/>
-    <p:sldId id="331" r:id="rId98"/>
+    <p:sldId id="356" r:id="rId96"/>
+    <p:sldId id="354" r:id="rId97"/>
+    <p:sldId id="329" r:id="rId98"/>
+    <p:sldId id="330" r:id="rId99"/>
+    <p:sldId id="331" r:id="rId100"/>
   </p:sldIdLst>
   <p:sldSz cx="9144000" cy="6858000" type="screen4x3"/>
   <p:notesSz cx="6858000" cy="9144000"/>
@@ -315,8 +317,8 @@
             <p14:sldId id="349"/>
             <p14:sldId id="350"/>
             <p14:sldId id="351"/>
+            <p14:sldId id="352"/>
             <p14:sldId id="344"/>
-            <p14:sldId id="352"/>
             <p14:sldId id="342"/>
             <p14:sldId id="325"/>
           </p14:sldIdLst>
@@ -335,6 +337,8 @@
         <p14:section name="Differential Expression Analysis using edgeR " id="{30EFFB20-8E58-DE4F-AD04-B868D801F83F}">
           <p14:sldIdLst>
             <p14:sldId id="328"/>
+            <p14:sldId id="356"/>
+            <p14:sldId id="354"/>
             <p14:sldId id="329"/>
           </p14:sldIdLst>
         </p14:section>
@@ -604,7 +608,7 @@
             <a:fld id="{28E80666-FB37-4B36-9149-507F3B0178E3}" type="datetimeFigureOut">
               <a:rPr lang="en-US" smtClean="0"/>
               <a:pPr/>
-              <a:t>7/16/15</a:t>
+              <a:t>7/19/15</a:t>
             </a:fld>
             <a:endParaRPr lang="en-US"/>
           </a:p>
@@ -817,7 +821,7 @@
           <a:p>
             <a:fld id="{6BF71803-6BD7-554E-8A98-DA69116549C9}" type="datetimeFigureOut">
               <a:rPr lang="en-US" smtClean="0"/>
-              <a:t>7/16/15</a:t>
+              <a:t>7/19/15</a:t>
             </a:fld>
             <a:endParaRPr lang="en-US"/>
           </a:p>
@@ -1084,7 +1088,7 @@
           <a:p>
             <a:fld id="{6BF71803-6BD7-554E-8A98-DA69116549C9}" type="datetimeFigureOut">
               <a:rPr lang="en-US" smtClean="0"/>
-              <a:t>7/16/15</a:t>
+              <a:t>7/19/15</a:t>
             </a:fld>
             <a:endParaRPr lang="en-US"/>
           </a:p>
@@ -1234,7 +1238,7 @@
           <a:p>
             <a:fld id="{6BF71803-6BD7-554E-8A98-DA69116549C9}" type="datetimeFigureOut">
               <a:rPr lang="en-US" smtClean="0"/>
-              <a:t>7/16/15</a:t>
+              <a:t>7/19/15</a:t>
             </a:fld>
             <a:endParaRPr lang="en-US"/>
           </a:p>
@@ -1565,7 +1569,7 @@
             <a:fld id="{28E80666-FB37-4B36-9149-507F3B0178E3}" type="datetimeFigureOut">
               <a:rPr lang="en-US" smtClean="0"/>
               <a:pPr/>
-              <a:t>7/16/15</a:t>
+              <a:t>7/19/15</a:t>
             </a:fld>
             <a:endParaRPr lang="en-US"/>
           </a:p>
@@ -1874,7 +1878,7 @@
           <a:p>
             <a:fld id="{6BF71803-6BD7-554E-8A98-DA69116549C9}" type="datetimeFigureOut">
               <a:rPr lang="en-US" smtClean="0"/>
-              <a:t>7/16/15</a:t>
+              <a:t>7/19/15</a:t>
             </a:fld>
             <a:endParaRPr lang="en-US"/>
           </a:p>
@@ -2295,7 +2299,7 @@
           <a:p>
             <a:fld id="{6BF71803-6BD7-554E-8A98-DA69116549C9}" type="datetimeFigureOut">
               <a:rPr lang="en-US" smtClean="0"/>
-              <a:t>7/16/15</a:t>
+              <a:t>7/19/15</a:t>
             </a:fld>
             <a:endParaRPr lang="en-US"/>
           </a:p>
@@ -2408,7 +2412,7 @@
           <a:p>
             <a:fld id="{6BF71803-6BD7-554E-8A98-DA69116549C9}" type="datetimeFigureOut">
               <a:rPr lang="en-US" smtClean="0"/>
-              <a:t>7/16/15</a:t>
+              <a:t>7/19/15</a:t>
             </a:fld>
             <a:endParaRPr lang="en-US"/>
           </a:p>
@@ -2567,7 +2571,7 @@
           <a:p>
             <a:fld id="{6BF71803-6BD7-554E-8A98-DA69116549C9}" type="datetimeFigureOut">
               <a:rPr lang="en-US" smtClean="0"/>
-              <a:t>7/16/15</a:t>
+              <a:t>7/19/15</a:t>
             </a:fld>
             <a:endParaRPr lang="en-US"/>
           </a:p>
@@ -2951,7 +2955,7 @@
           <a:p>
             <a:fld id="{6BF71803-6BD7-554E-8A98-DA69116549C9}" type="datetimeFigureOut">
               <a:rPr lang="en-US" smtClean="0"/>
-              <a:t>7/16/15</a:t>
+              <a:t>7/19/15</a:t>
             </a:fld>
             <a:endParaRPr lang="en-US"/>
           </a:p>
@@ -3314,7 +3318,7 @@
           <a:p>
             <a:fld id="{6BF71803-6BD7-554E-8A98-DA69116549C9}" type="datetimeFigureOut">
               <a:rPr lang="en-US" smtClean="0"/>
-              <a:t>7/16/15</a:t>
+              <a:t>7/19/15</a:t>
             </a:fld>
             <a:endParaRPr lang="en-US"/>
           </a:p>
@@ -3648,7 +3652,7 @@
           <a:p>
             <a:fld id="{6BF71803-6BD7-554E-8A98-DA69116549C9}" type="datetimeFigureOut">
               <a:rPr lang="en-US" smtClean="0"/>
-              <a:t>7/16/15</a:t>
+              <a:t>7/19/15</a:t>
             </a:fld>
             <a:endParaRPr lang="en-US"/>
           </a:p>
@@ -4271,11 +4275,7 @@
           <a:p>
             <a:r>
               <a:rPr lang="en-US" dirty="0" smtClean="0"/>
-              <a:t>Section </a:t>
-            </a:r>
-            <a:r>
-              <a:rPr lang="en-US" dirty="0" smtClean="0"/>
-              <a:t>2</a:t>
+              <a:t>Section 2</a:t>
             </a:r>
             <a:endParaRPr lang="en-US" dirty="0"/>
           </a:p>
@@ -5681,11 +5681,7 @@
             <a:pPr lvl="1"/>
             <a:r>
               <a:rPr lang="en-US" dirty="0" smtClean="0"/>
-              <a:t>High </a:t>
-            </a:r>
-            <a:r>
-              <a:rPr lang="en-US" dirty="0" smtClean="0"/>
-              <a:t>throughput sequencing</a:t>
+              <a:t>High throughput sequencing</a:t>
             </a:r>
           </a:p>
           <a:p>
@@ -5735,11 +5731,7 @@
             </a:pPr>
             <a:r>
               <a:rPr lang="en-US" dirty="0" smtClean="0"/>
-              <a:t>Overview </a:t>
-            </a:r>
-            <a:r>
-              <a:rPr lang="en-US" dirty="0" smtClean="0"/>
-              <a:t>of RNA-</a:t>
+              <a:t>Overview of RNA-</a:t>
             </a:r>
             <a:r>
               <a:rPr lang="en-US" dirty="0" err="1" smtClean="0"/>
@@ -5963,11 +5955,7 @@
           <a:p>
             <a:r>
               <a:rPr lang="en-US" dirty="0" smtClean="0"/>
-              <a:t>What </a:t>
-            </a:r>
-            <a:r>
-              <a:rPr lang="en-US" dirty="0" smtClean="0"/>
-              <a:t>are the differences between the </a:t>
+              <a:t>What are the differences between the </a:t>
             </a:r>
             <a:r>
               <a:rPr lang="en-US" dirty="0" err="1" smtClean="0"/>
@@ -6007,7 +5995,6 @@
               <a:rPr lang="en-US" dirty="0" smtClean="0"/>
               <a:t> 3000 </a:t>
             </a:r>
-            <a:endParaRPr lang="en-US" dirty="0" smtClean="0"/>
           </a:p>
         </p:txBody>
       </p:sp>
@@ -6075,7 +6062,6 @@
               <a:rPr lang="en-US" dirty="0"/>
               <a:t>1</a:t>
             </a:r>
-            <a:endParaRPr lang="en-US" dirty="0"/>
           </a:p>
         </p:txBody>
       </p:sp>
@@ -6286,7 +6272,6 @@
               <a:rPr lang="en-US" sz="2400" dirty="0" smtClean="0"/>
               <a:t>can, reliably</a:t>
             </a:r>
-            <a:endParaRPr lang="en-US" sz="2400" dirty="0" smtClean="0"/>
           </a:p>
           <a:p>
             <a:r>
@@ -7100,18 +7085,12 @@
               <a:rPr lang="en-US" sz="2800" dirty="0" smtClean="0"/>
               <a:t>Considerations</a:t>
             </a:r>
-            <a:endParaRPr lang="en-US" sz="2800" dirty="0" smtClean="0"/>
           </a:p>
           <a:p>
             <a:r>
               <a:rPr lang="en-US" sz="2800" dirty="0" smtClean="0"/>
-              <a:t>QA/QC of </a:t>
-            </a:r>
-            <a:r>
-              <a:rPr lang="en-US" sz="2800" dirty="0" smtClean="0"/>
-              <a:t>RNA samples</a:t>
-            </a:r>
-            <a:endParaRPr lang="en-US" sz="2800" dirty="0" smtClean="0"/>
+              <a:t>QA/QC of RNA samples</a:t>
+            </a:r>
           </a:p>
           <a:p>
             <a:r>
@@ -7141,11 +7120,7 @@
             </a:r>
             <a:r>
               <a:rPr lang="en-US" sz="2400" dirty="0" err="1" smtClean="0"/>
-              <a:t>U</a:t>
-            </a:r>
-            <a:r>
-              <a:rPr lang="en-US" sz="2400" dirty="0" err="1" smtClean="0"/>
-              <a:t>nstranded</a:t>
+              <a:t>Unstranded</a:t>
             </a:r>
             <a:endParaRPr lang="en-US" sz="2400" dirty="0" smtClean="0"/>
           </a:p>
@@ -7166,7 +7141,6 @@
               <a:rPr lang="en-US" sz="2400" dirty="0" smtClean="0"/>
               <a:t>Final QA</a:t>
             </a:r>
-            <a:endParaRPr lang="en-US" sz="2400" dirty="0" smtClean="0"/>
           </a:p>
         </p:txBody>
       </p:sp>
@@ -7315,11 +7289,7 @@
           <a:p>
             <a:r>
               <a:rPr lang="en-US" dirty="0" smtClean="0"/>
-              <a:t>QA/</a:t>
-            </a:r>
-            <a:r>
-              <a:rPr lang="en-US" dirty="0" smtClean="0"/>
-              <a:t>QC of RNA samples</a:t>
+              <a:t>QA/QC of RNA samples</a:t>
             </a:r>
             <a:endParaRPr lang="en-US" dirty="0"/>
           </a:p>
@@ -7580,15 +7550,7 @@
             </a:r>
             <a:r>
               <a:rPr lang="en-US" dirty="0" smtClean="0"/>
-              <a:t>) is mainly used when your experiment calls </a:t>
-            </a:r>
-            <a:r>
-              <a:rPr lang="en-US" dirty="0" smtClean="0"/>
-              <a:t>for sequencing </a:t>
-            </a:r>
-            <a:r>
-              <a:rPr lang="en-US" dirty="0" smtClean="0"/>
-              <a:t>non-</a:t>
+              <a:t>) is mainly used when your experiment calls for sequencing non-</a:t>
             </a:r>
             <a:r>
               <a:rPr lang="en-US" dirty="0" err="1" smtClean="0"/>
@@ -7604,19 +7566,7 @@
             </a:r>
             <a:r>
               <a:rPr lang="en-US" dirty="0" smtClean="0"/>
-              <a:t>) populations. This method </a:t>
-            </a:r>
-            <a:r>
-              <a:rPr lang="en-US" dirty="0" smtClean="0"/>
-              <a:t>is also </a:t>
-            </a:r>
-            <a:r>
-              <a:rPr lang="en-US" dirty="0" smtClean="0"/>
-              <a:t>usually more </a:t>
-            </a:r>
-            <a:r>
-              <a:rPr lang="en-US" dirty="0" smtClean="0"/>
-              <a:t>costly.</a:t>
+              <a:t>) populations. This method is also usually more costly.</a:t>
             </a:r>
             <a:endParaRPr lang="en-US" dirty="0"/>
           </a:p>
@@ -7919,7 +7869,6 @@
               <a:rPr lang="en-US" dirty="0"/>
               <a:t>method </a:t>
             </a:r>
-            <a:endParaRPr lang="en-US" dirty="0"/>
           </a:p>
           <a:p>
             <a:r>
@@ -8086,11 +8035,7 @@
             </a:pPr>
             <a:r>
               <a:rPr lang="en-US" dirty="0" smtClean="0"/>
-              <a:t>Read </a:t>
-            </a:r>
-            <a:r>
-              <a:rPr lang="en-US" dirty="0" smtClean="0"/>
-              <a:t>Preprocessing</a:t>
+              <a:t>Read Preprocessing</a:t>
             </a:r>
           </a:p>
           <a:p>
@@ -8602,7 +8547,6 @@
               <a:rPr lang="en-US" dirty="0"/>
               <a:t>In high throughput biological work (Microarrays, Sequencing, HT Genotyping, etc.), what may seem like small technical artifacts introduced during sample extraction/preparation can lead to large changes, or bias, in the data. </a:t>
             </a:r>
-            <a:endParaRPr lang="en-US" dirty="0"/>
           </a:p>
           <a:p>
             <a:r>
@@ -8629,7 +8573,6 @@
               <a:rPr lang="en-US" dirty="0"/>
               <a:t>and may cause significant issues during analysis. </a:t>
             </a:r>
-            <a:endParaRPr lang="en-US" dirty="0"/>
           </a:p>
           <a:p>
             <a:endParaRPr lang="en-US" dirty="0"/>
@@ -8731,7 +8674,6 @@
               <a:rPr lang="en-US" dirty="0" smtClean="0"/>
               <a:t>Search the internet for RNA-SEQ coverage recommendations. Then we will talk about them</a:t>
             </a:r>
-            <a:endParaRPr lang="en-US" dirty="0" smtClean="0"/>
           </a:p>
         </p:txBody>
       </p:sp>
@@ -8852,11 +8794,7 @@
           <a:p>
             <a:r>
               <a:rPr lang="en-US" dirty="0" smtClean="0"/>
-              <a:t>Section </a:t>
-            </a:r>
-            <a:r>
-              <a:rPr lang="en-US" dirty="0" smtClean="0"/>
-              <a:t>3</a:t>
+              <a:t>Section 3</a:t>
             </a:r>
             <a:endParaRPr lang="en-US" dirty="0"/>
           </a:p>
@@ -9461,7 +9399,6 @@
               <a:rPr lang="en-US" dirty="0"/>
               <a:t>4</a:t>
             </a:r>
-            <a:endParaRPr lang="en-US" dirty="0"/>
           </a:p>
         </p:txBody>
       </p:sp>
@@ -9525,7 +9462,6 @@
               <a:rPr lang="en-US" dirty="0"/>
               <a:t>4</a:t>
             </a:r>
-            <a:endParaRPr lang="en-US" dirty="0"/>
           </a:p>
         </p:txBody>
       </p:sp>
@@ -11067,7 +11003,6 @@
               <a:rPr lang="en-US" dirty="0" smtClean="0"/>
               <a:t> install</a:t>
             </a:r>
-            <a:endParaRPr lang="en-US" dirty="0" smtClean="0"/>
           </a:p>
         </p:txBody>
       </p:sp>
@@ -11967,7 +11902,6 @@
               <a:rPr lang="en-US" b="1" dirty="0" smtClean="0"/>
               <a:t> file</a:t>
             </a:r>
-            <a:endParaRPr lang="en-US" b="1" dirty="0" smtClean="0"/>
           </a:p>
         </p:txBody>
       </p:sp>
@@ -12031,7 +11965,6 @@
               <a:rPr lang="en-US" dirty="0"/>
               <a:t>6</a:t>
             </a:r>
-            <a:endParaRPr lang="en-US" dirty="0"/>
           </a:p>
         </p:txBody>
       </p:sp>
@@ -12089,11 +12022,7 @@
           <a:p>
             <a:r>
               <a:rPr lang="en-US" dirty="0" smtClean="0"/>
-              <a:t>Section </a:t>
-            </a:r>
-            <a:r>
-              <a:rPr lang="en-US" dirty="0" smtClean="0"/>
-              <a:t>5</a:t>
+              <a:t>Section 5</a:t>
             </a:r>
             <a:endParaRPr lang="en-US" dirty="0"/>
           </a:p>
@@ -12176,11 +12105,7 @@
           <a:p>
             <a:r>
               <a:rPr lang="en-US" dirty="0" smtClean="0"/>
-              <a:t>SECTION </a:t>
-            </a:r>
-            <a:r>
-              <a:rPr lang="en-US" dirty="0" smtClean="0"/>
-              <a:t>1</a:t>
+              <a:t>SECTION 1</a:t>
             </a:r>
             <a:endParaRPr lang="en-US" dirty="0"/>
           </a:p>
@@ -12304,6 +12229,13 @@
   <p:clrMapOvr>
     <a:masterClrMapping/>
   </p:clrMapOvr>
+  <p:timing>
+    <p:tnLst>
+      <p:par>
+        <p:cTn xmlns:p14="http://schemas.microsoft.com/office/powerpoint/2010/main" id="1" dur="indefinite" restart="never" nodeType="tmRoot"/>
+      </p:par>
+    </p:tnLst>
+  </p:timing>
 </p:sld>
 </file>
 
@@ -12382,6 +12314,13 @@
   <p:clrMapOvr>
     <a:masterClrMapping/>
   </p:clrMapOvr>
+  <p:timing>
+    <p:tnLst>
+      <p:par>
+        <p:cTn xmlns:p14="http://schemas.microsoft.com/office/powerpoint/2010/main" id="1" dur="indefinite" restart="never" nodeType="tmRoot"/>
+      </p:par>
+    </p:tnLst>
+  </p:timing>
 </p:sld>
 </file>
 
@@ -12469,6 +12408,13 @@
   <p:clrMapOvr>
     <a:masterClrMapping/>
   </p:clrMapOvr>
+  <p:timing>
+    <p:tnLst>
+      <p:par>
+        <p:cTn xmlns:p14="http://schemas.microsoft.com/office/powerpoint/2010/main" id="1" dur="indefinite" restart="never" nodeType="tmRoot"/>
+      </p:par>
+    </p:tnLst>
+  </p:timing>
 </p:sld>
 </file>
 
@@ -12499,10 +12445,15 @@
             <p:ph idx="1"/>
           </p:nvPr>
         </p:nvSpPr>
-        <p:spPr/>
+        <p:spPr>
+          <a:xfrm>
+            <a:off x="380999" y="1719071"/>
+            <a:ext cx="8407893" cy="4965140"/>
+          </a:xfrm>
+        </p:spPr>
         <p:txBody>
           <a:bodyPr>
-            <a:normAutofit/>
+            <a:normAutofit lnSpcReduction="10000"/>
           </a:bodyPr>
           <a:lstStyle/>
           <a:p>
@@ -12534,7 +12485,22 @@
             <a:pPr lvl="1"/>
             <a:r>
               <a:rPr lang="en-US" dirty="0"/>
-              <a:t>EAS139 the unique instrument name 136 the run id </a:t>
+              <a:t>EAS139 the unique instrument </a:t>
+            </a:r>
+            <a:r>
+              <a:rPr lang="en-US" dirty="0" smtClean="0"/>
+              <a:t>name</a:t>
+            </a:r>
+          </a:p>
+          <a:p>
+            <a:pPr lvl="1"/>
+            <a:r>
+              <a:rPr lang="en-US" dirty="0" smtClean="0"/>
+              <a:t>136 </a:t>
+            </a:r>
+            <a:r>
+              <a:rPr lang="en-US" dirty="0"/>
+              <a:t>the run id </a:t>
             </a:r>
           </a:p>
           <a:p>
@@ -12549,7 +12515,18 @@
             </a:r>
             <a:r>
               <a:rPr lang="en-US" dirty="0"/>
-              <a:t> id 2 </a:t>
+              <a:t> </a:t>
+            </a:r>
+            <a:r>
+              <a:rPr lang="en-US" dirty="0" smtClean="0"/>
+              <a:t>id</a:t>
+            </a:r>
+          </a:p>
+          <a:p>
+            <a:pPr lvl="1"/>
+            <a:r>
+              <a:rPr lang="en-US" dirty="0" smtClean="0"/>
+              <a:t>2 </a:t>
             </a:r>
             <a:r>
               <a:rPr lang="en-US" dirty="0" err="1"/>
@@ -12692,6 +12669,13 @@
   <p:clrMapOvr>
     <a:masterClrMapping/>
   </p:clrMapOvr>
+  <p:timing>
+    <p:tnLst>
+      <p:par>
+        <p:cTn xmlns:p14="http://schemas.microsoft.com/office/powerpoint/2010/main" id="1" dur="indefinite" restart="never" nodeType="tmRoot"/>
+      </p:par>
+    </p:tnLst>
+  </p:timing>
 </p:sld>
 </file>
 
@@ -12756,7 +12740,6 @@
               <a:rPr lang="en-US" sz="2400" dirty="0"/>
               <a:t>/SAM1.pdf </a:t>
             </a:r>
-            <a:endParaRPr lang="en-US" sz="2400" dirty="0"/>
           </a:p>
           <a:p>
             <a:r>
@@ -12767,7 +12750,6 @@
               <a:rPr lang="en-US" sz="2800" dirty="0"/>
               <a:t>SAM for fast querying </a:t>
             </a:r>
-            <a:endParaRPr lang="en-US" sz="2800" dirty="0"/>
           </a:p>
         </p:txBody>
       </p:sp>
@@ -12808,6 +12790,13 @@
   <p:clrMapOvr>
     <a:masterClrMapping/>
   </p:clrMapOvr>
+  <p:timing>
+    <p:tnLst>
+      <p:par>
+        <p:cTn xmlns:p14="http://schemas.microsoft.com/office/powerpoint/2010/main" id="1" dur="indefinite" restart="never" nodeType="tmRoot"/>
+      </p:par>
+    </p:tnLst>
+  </p:timing>
 </p:sld>
 </file>
 
@@ -12926,6 +12915,13 @@
   <p:clrMapOvr>
     <a:masterClrMapping/>
   </p:clrMapOvr>
+  <p:timing>
+    <p:tnLst>
+      <p:par>
+        <p:cTn xmlns:p14="http://schemas.microsoft.com/office/powerpoint/2010/main" id="1" dur="indefinite" restart="never" nodeType="tmRoot"/>
+      </p:par>
+    </p:tnLst>
+  </p:timing>
 </p:sld>
 </file>
 
@@ -13004,6 +13000,13 @@
   <p:clrMapOvr>
     <a:masterClrMapping/>
   </p:clrMapOvr>
+  <p:timing>
+    <p:tnLst>
+      <p:par>
+        <p:cTn xmlns:p14="http://schemas.microsoft.com/office/powerpoint/2010/main" id="1" dur="indefinite" restart="never" nodeType="tmRoot"/>
+      </p:par>
+    </p:tnLst>
+  </p:timing>
 </p:sld>
 </file>
 
@@ -13082,6 +13085,13 @@
   <p:clrMapOvr>
     <a:masterClrMapping/>
   </p:clrMapOvr>
+  <p:timing>
+    <p:tnLst>
+      <p:par>
+        <p:cTn xmlns:p14="http://schemas.microsoft.com/office/powerpoint/2010/main" id="1" dur="indefinite" restart="never" nodeType="tmRoot"/>
+      </p:par>
+    </p:tnLst>
+  </p:timing>
 </p:sld>
 </file>
 
@@ -13136,7 +13146,6 @@
               <a:rPr lang="en-US" dirty="0"/>
               <a:t>-scaled posterior probability that the mapping position" is wrong. </a:t>
             </a:r>
-            <a:endParaRPr lang="en-US" dirty="0"/>
           </a:p>
           <a:p>
             <a:endParaRPr lang="en-US" dirty="0" smtClean="0"/>
@@ -13222,6 +13231,13 @@
   <p:clrMapOvr>
     <a:masterClrMapping/>
   </p:clrMapOvr>
+  <p:timing>
+    <p:tnLst>
+      <p:par>
+        <p:cTn xmlns:p14="http://schemas.microsoft.com/office/powerpoint/2010/main" id="1" dur="indefinite" restart="never" nodeType="tmRoot"/>
+      </p:par>
+    </p:tnLst>
+  </p:timing>
 </p:sld>
 </file>
 
@@ -13287,7 +13303,6 @@
               <a:rPr lang="en-US" dirty="0"/>
               <a:t>base quality of the read. Low quality means the observed read sequence is possibly wrong, and wrong sequence may lead to a wrong alignment. </a:t>
             </a:r>
-            <a:endParaRPr lang="en-US" dirty="0"/>
           </a:p>
           <a:p>
             <a:pPr lvl="1"/>
@@ -13295,7 +13310,6 @@
               <a:rPr lang="en-US" dirty="0"/>
               <a:t>The sensitivity of the alignment algorithm. The true hit is more likely to be missed by an algorithm with low sensitivity, which also causes mapping errors. </a:t>
             </a:r>
-            <a:endParaRPr lang="en-US" dirty="0"/>
           </a:p>
           <a:p>
             <a:pPr lvl="1"/>
@@ -13303,7 +13317,6 @@
               <a:rPr lang="en-US" dirty="0"/>
               <a:t>Paired end or not. Reads mapped in pairs are more likely to be correct. </a:t>
             </a:r>
-            <a:endParaRPr lang="en-US" dirty="0"/>
           </a:p>
           <a:p>
             <a:endParaRPr lang="en-US" dirty="0"/>
@@ -13347,6 +13360,13 @@
   <p:clrMapOvr>
     <a:masterClrMapping/>
   </p:clrMapOvr>
+  <p:timing>
+    <p:tnLst>
+      <p:par>
+        <p:cTn xmlns:p14="http://schemas.microsoft.com/office/powerpoint/2010/main" id="1" dur="indefinite" restart="never" nodeType="tmRoot"/>
+      </p:par>
+    </p:tnLst>
+  </p:timing>
 </p:sld>
 </file>
 
@@ -13740,7 +13760,6 @@
               <a:rPr lang="en-US" dirty="0"/>
               <a:t>it usually implies: </a:t>
             </a:r>
-            <a:endParaRPr lang="en-US" dirty="0"/>
           </a:p>
           <a:p>
             <a:pPr lvl="1"/>
@@ -13760,7 +13779,6 @@
               <a:rPr lang="en-US" dirty="0"/>
               <a:t>best alignment has few mismatches. </a:t>
             </a:r>
-            <a:endParaRPr lang="en-US" dirty="0"/>
           </a:p>
           <a:p>
             <a:pPr lvl="1"/>
@@ -13776,7 +13794,6 @@
               <a:rPr lang="en-US" dirty="0"/>
               <a:t>or sequencing errors. </a:t>
             </a:r>
-            <a:endParaRPr lang="en-US" dirty="0"/>
           </a:p>
           <a:p>
             <a:pPr marL="45720" indent="0">
@@ -13869,11 +13886,6 @@
               </a:rPr>
               <a:t>In practice however, each mapper seems to compute the MAPQ in their own way. </a:t>
             </a:r>
-            <a:endParaRPr lang="en-US" sz="2400" dirty="0">
-              <a:solidFill>
-                <a:srgbClr val="FF0000"/>
-              </a:solidFill>
-            </a:endParaRPr>
           </a:p>
         </p:txBody>
       </p:sp>
@@ -13887,6 +13899,13 @@
   <p:clrMapOvr>
     <a:masterClrMapping/>
   </p:clrMapOvr>
+  <p:timing>
+    <p:tnLst>
+      <p:par>
+        <p:cTn xmlns:p14="http://schemas.microsoft.com/office/powerpoint/2010/main" id="1" dur="indefinite" restart="never" nodeType="tmRoot"/>
+      </p:par>
+    </p:tnLst>
+  </p:timing>
 </p:sld>
 </file>
 
@@ -13949,7 +13968,6 @@
               <a:rPr lang="en-US" dirty="0"/>
               <a:t>Compact Idiosyncratic Gapped Alignment Report (CIGAR) SAM flag field: </a:t>
             </a:r>
-            <a:endParaRPr lang="en-US" dirty="0"/>
           </a:p>
           <a:p>
             <a:pPr marL="45720" indent="0">
@@ -13999,6 +14017,13 @@
   <p:clrMapOvr>
     <a:masterClrMapping/>
   </p:clrMapOvr>
+  <p:timing>
+    <p:tnLst>
+      <p:par>
+        <p:cTn xmlns:p14="http://schemas.microsoft.com/office/powerpoint/2010/main" id="1" dur="indefinite" restart="never" nodeType="tmRoot"/>
+      </p:par>
+    </p:tnLst>
+  </p:timing>
 </p:sld>
 </file>
 
@@ -14424,7 +14449,28 @@
             </a:pPr>
             <a:r>
               <a:rPr lang="en-US" dirty="0" smtClean="0"/>
-              <a:t>CIGAR: 3M1I3M1D5M</a:t>
+              <a:t>CIGAR: </a:t>
+            </a:r>
+            <a:r>
+              <a:rPr lang="en-US" dirty="0" smtClean="0"/>
+              <a:t>3M1I6M1D2M </a:t>
+            </a:r>
+          </a:p>
+          <a:p>
+            <a:pPr marL="45720" indent="0">
+              <a:buFont typeface="Wingdings 2" pitchFamily="18" charset="2"/>
+              <a:buNone/>
+            </a:pPr>
+            <a:endParaRPr lang="en-US" dirty="0"/>
+          </a:p>
+          <a:p>
+            <a:pPr marL="45720" indent="0">
+              <a:buFont typeface="Wingdings 2" pitchFamily="18" charset="2"/>
+              <a:buNone/>
+            </a:pPr>
+            <a:r>
+              <a:rPr lang="en-US" dirty="0" smtClean="0"/>
+              <a:t>** mismatches are not considered in standard CIGAR</a:t>
             </a:r>
             <a:endParaRPr lang="en-US" dirty="0"/>
           </a:p>
@@ -14440,6 +14486,13 @@
   <p:clrMapOvr>
     <a:masterClrMapping/>
   </p:clrMapOvr>
+  <p:timing>
+    <p:tnLst>
+      <p:par>
+        <p:cTn xmlns:p14="http://schemas.microsoft.com/office/powerpoint/2010/main" id="1" dur="indefinite" restart="never" nodeType="tmRoot"/>
+      </p:par>
+    </p:tnLst>
+  </p:timing>
 </p:sld>
 </file>
 
@@ -14613,6 +14666,13 @@
   <p:clrMapOvr>
     <a:masterClrMapping/>
   </p:clrMapOvr>
+  <p:timing>
+    <p:tnLst>
+      <p:par>
+        <p:cTn xmlns:p14="http://schemas.microsoft.com/office/powerpoint/2010/main" id="1" dur="indefinite" restart="never" nodeType="tmRoot"/>
+      </p:par>
+    </p:tnLst>
+  </p:timing>
 </p:sld>
 </file>
 
@@ -14927,11 +14987,7 @@
           <a:p>
             <a:r>
               <a:rPr lang="en-US" dirty="0" smtClean="0"/>
-              <a:t>Section </a:t>
-            </a:r>
-            <a:r>
-              <a:rPr lang="en-US" dirty="0" smtClean="0"/>
-              <a:t>6</a:t>
+              <a:t>Section 6</a:t>
             </a:r>
             <a:endParaRPr lang="en-US" dirty="0"/>
           </a:p>
@@ -15038,7 +15094,6 @@
               <a:rPr lang="en-US" dirty="0"/>
               <a:t>are: </a:t>
             </a:r>
-            <a:endParaRPr lang="en-US" dirty="0"/>
           </a:p>
           <a:p>
             <a:pPr lvl="1"/>
@@ -15046,7 +15101,6 @@
               <a:rPr lang="en-US" dirty="0"/>
               <a:t>not of primary interest (contamination) </a:t>
             </a:r>
-            <a:endParaRPr lang="en-US" dirty="0"/>
           </a:p>
           <a:p>
             <a:pPr lvl="1"/>
@@ -15054,7 +15108,6 @@
               <a:rPr lang="en-US" dirty="0"/>
               <a:t>originate from PCR duplication </a:t>
             </a:r>
-            <a:endParaRPr lang="en-US" dirty="0"/>
           </a:p>
           <a:p>
             <a:pPr lvl="1"/>
@@ -15062,7 +15115,6 @@
               <a:rPr lang="en-US" dirty="0"/>
               <a:t>artificially added onto sequence of primary interest (vectors, adapters, primers) </a:t>
             </a:r>
-            <a:endParaRPr lang="en-US" dirty="0"/>
           </a:p>
           <a:p>
             <a:pPr lvl="1"/>
@@ -15116,7 +15168,6 @@
               <a:rPr lang="en-US" dirty="0"/>
               <a:t>short overlapping paired-end reads </a:t>
             </a:r>
-            <a:endParaRPr lang="en-US" dirty="0"/>
           </a:p>
           <a:p>
             <a:endParaRPr lang="en-US" dirty="0"/>
@@ -15202,7 +15253,6 @@
               <a:rPr lang="en-US" dirty="0"/>
               <a:t>Identity and remove contaminant and vector reads </a:t>
             </a:r>
-            <a:endParaRPr lang="en-US" dirty="0"/>
           </a:p>
           <a:p>
             <a:pPr lvl="1"/>
@@ -15210,7 +15260,6 @@
               <a:rPr lang="en-US" dirty="0"/>
               <a:t>Reads which appear to fully come from extraneous sequence should be removed. </a:t>
             </a:r>
-            <a:endParaRPr lang="en-US" dirty="0"/>
           </a:p>
           <a:p>
             <a:r>
@@ -15221,7 +15270,6 @@
               <a:rPr lang="en-US" dirty="0"/>
               <a:t>trim/cut </a:t>
             </a:r>
-            <a:endParaRPr lang="en-US" dirty="0"/>
           </a:p>
           <a:p>
             <a:pPr lvl="1"/>
@@ -15277,14 +15325,12 @@
               <a:rPr lang="en-US" dirty="0"/>
               <a:t>If you can afford the loss of coverage, you might throw away all reads containing Ns. </a:t>
             </a:r>
-            <a:endParaRPr lang="en-US" dirty="0"/>
           </a:p>
           <a:p>
             <a:r>
               <a:rPr lang="en-US" dirty="0"/>
               <a:t>Identity and trim off adapter and barcodes if present </a:t>
             </a:r>
-            <a:endParaRPr lang="en-US" dirty="0"/>
           </a:p>
           <a:p>
             <a:pPr lvl="1"/>
@@ -16052,7 +16098,6 @@
               <a:rPr lang="en-US" dirty="0"/>
               <a:t>read) </a:t>
             </a:r>
-            <a:endParaRPr lang="en-US" dirty="0"/>
           </a:p>
           <a:p>
             <a:r>
@@ -16263,7 +16308,6 @@
               <a:rPr lang="en-US" dirty="0"/>
               <a:t>help inform you of what you might do in the future. </a:t>
             </a:r>
-            <a:endParaRPr lang="en-US" dirty="0"/>
           </a:p>
           <a:p>
             <a:r>
@@ -16284,7 +16328,31 @@
             </a:r>
             <a:r>
               <a:rPr lang="en-US" dirty="0" smtClean="0"/>
-              <a:t>themselves as they compare to other samples (REMEMBER, BE CONSISTANT). </a:t>
+              <a:t>themselves as they compare to other samples </a:t>
+            </a:r>
+            <a:r>
+              <a:rPr lang="en-US" dirty="0" smtClean="0"/>
+              <a:t>	</a:t>
+            </a:r>
+            <a:r>
+              <a:rPr lang="en-US" dirty="0" smtClean="0">
+                <a:solidFill>
+                  <a:srgbClr val="FF0000"/>
+                </a:solidFill>
+              </a:rPr>
+              <a:t>	(</a:t>
+            </a:r>
+            <a:r>
+              <a:rPr lang="en-US" dirty="0" smtClean="0">
+                <a:solidFill>
+                  <a:srgbClr val="FF0000"/>
+                </a:solidFill>
+              </a:rPr>
+              <a:t>REMEMBER, BE CONSISTANT)</a:t>
+            </a:r>
+            <a:r>
+              <a:rPr lang="en-US" dirty="0" smtClean="0"/>
+              <a:t>. </a:t>
             </a:r>
           </a:p>
           <a:p>
@@ -16633,15 +16701,7 @@
                   <a:srgbClr val="3366FF"/>
                 </a:solidFill>
               </a:rPr>
-              <a:t> is defaulte</a:t>
-            </a:r>
-            <a:r>
-              <a:rPr lang="en-US" sz="2000" dirty="0" smtClean="0">
-                <a:solidFill>
-                  <a:srgbClr val="3366FF"/>
-                </a:solidFill>
-              </a:rPr>
-              <a:t>d for 2x100bp paired-end DNA samples</a:t>
+              <a:t> is defaulted for 2x100bp paired-end DNA samples</a:t>
             </a:r>
             <a:endParaRPr lang="en-US" sz="2000" dirty="0">
               <a:solidFill>
@@ -16882,7 +16942,6 @@
               <a:rPr lang="en-US" dirty="0"/>
               <a:t>When complete perform QA/QC</a:t>
             </a:r>
-            <a:endParaRPr lang="en-US" dirty="0"/>
           </a:p>
         </p:txBody>
       </p:sp>
@@ -17003,7 +17062,6 @@
               <a:rPr lang="en-US" dirty="0"/>
               <a:t>7</a:t>
             </a:r>
-            <a:endParaRPr lang="en-US" dirty="0"/>
           </a:p>
         </p:txBody>
       </p:sp>
@@ -17105,7 +17163,6 @@
               <a:rPr lang="en-US" dirty="0"/>
               <a:t>seeks to put together the puzzle without knowing what the picture is </a:t>
             </a:r>
-            <a:endParaRPr lang="en-US" dirty="0"/>
           </a:p>
           <a:p>
             <a:pPr lvl="1"/>
@@ -17113,14 +17170,12 @@
               <a:rPr lang="en-US" dirty="0"/>
               <a:t>Mapping tries to put together the puzzle pieces directly onto an image of the picture </a:t>
             </a:r>
-            <a:endParaRPr lang="en-US" dirty="0"/>
           </a:p>
           <a:p>
             <a:r>
               <a:rPr lang="en-US" dirty="0"/>
               <a:t>In mapping the question is more, given a small chunk of sequence, where in the genome did this piece most likely come from. </a:t>
             </a:r>
-            <a:endParaRPr lang="en-US" dirty="0"/>
           </a:p>
           <a:p>
             <a:r>
@@ -17159,7 +17214,6 @@
               <a:rPr lang="en-US" dirty="0"/>
               <a:t>. Main issues are: </a:t>
             </a:r>
-            <a:endParaRPr lang="en-US" dirty="0"/>
           </a:p>
           <a:p>
             <a:pPr lvl="1"/>
@@ -17204,7 +17258,6 @@
               <a:rPr lang="en-US" dirty="0"/>
               <a:t>(RNA, transcripts) </a:t>
             </a:r>
-            <a:endParaRPr lang="en-US" dirty="0"/>
           </a:p>
         </p:txBody>
       </p:sp>
@@ -17373,7 +17426,6 @@
               <a:rPr lang="en-US" dirty="0"/>
               <a:t>Problem: </a:t>
             </a:r>
-            <a:endParaRPr lang="en-US" dirty="0"/>
           </a:p>
           <a:p>
             <a:r>
@@ -17388,14 +17440,12 @@
               <a:rPr lang="en-US" dirty="0"/>
               <a:t> (dynamic programming) are slow, when the search space becomes large. </a:t>
             </a:r>
-            <a:endParaRPr lang="en-US" dirty="0"/>
           </a:p>
           <a:p>
             <a:r>
               <a:rPr lang="en-US" dirty="0"/>
               <a:t>-  With the advent of automated DNA sequencing technology, the database of possible matches was becoming increasingly larger. </a:t>
             </a:r>
-            <a:endParaRPr lang="en-US" dirty="0"/>
           </a:p>
           <a:p>
             <a:r>
@@ -17427,11 +17477,6 @@
               </a:rPr>
               <a:t>is a few-to-many - performs gapped alignment </a:t>
             </a:r>
-            <a:endParaRPr lang="en-US" dirty="0">
-              <a:solidFill>
-                <a:srgbClr val="FF0000"/>
-              </a:solidFill>
-            </a:endParaRPr>
           </a:p>
         </p:txBody>
       </p:sp>
@@ -17507,21 +17552,18 @@
               <a:rPr lang="en-US" dirty="0"/>
               <a:t>Blat (Jim Kent, UCSC, 2002) was designed to solve the problem of performing comparisons between large genomes and was one of the first algorithms to efficiently search many query sequences against a large database (a genome). Blat also performs a gapped-alignment for searching RNA sequences against a genome and handling splice junctions. </a:t>
             </a:r>
-            <a:endParaRPr lang="en-US" dirty="0"/>
           </a:p>
           <a:p>
             <a:r>
               <a:rPr lang="en-US" dirty="0"/>
               <a:t>gapped-alignment alignment allowing for insertions and deletions greater than a few base pairs. Gapped alignment are </a:t>
             </a:r>
-            <a:endParaRPr lang="en-US" dirty="0"/>
           </a:p>
           <a:p>
             <a:r>
               <a:rPr lang="en-US" dirty="0"/>
               <a:t>less efficient, but more accurate. </a:t>
             </a:r>
-            <a:endParaRPr lang="en-US" dirty="0"/>
           </a:p>
           <a:p>
             <a:pPr marL="45720" indent="0">
@@ -17549,11 +17591,6 @@
               </a:rPr>
               <a:t>is a many-to-many algorithm - performs gapped alignments </a:t>
             </a:r>
-            <a:endParaRPr lang="en-US" dirty="0">
-              <a:solidFill>
-                <a:srgbClr val="FF0000"/>
-              </a:solidFill>
-            </a:endParaRPr>
           </a:p>
           <a:p>
             <a:endParaRPr lang="en-US" dirty="0"/>
@@ -18180,7 +18217,6 @@
               <a:rPr lang="en-US" dirty="0"/>
               <a:t>Many additional algorithms have been developed since BLAST and BLAT, mainly improving on either speed or accuracy, or both. </a:t>
             </a:r>
-            <a:endParaRPr lang="en-US" dirty="0"/>
           </a:p>
           <a:p>
             <a:pPr marL="45720" indent="0">
@@ -18225,7 +18261,6 @@
               <a:rPr lang="en-US" dirty="0"/>
               <a:t>Problem: </a:t>
             </a:r>
-            <a:endParaRPr lang="en-US" dirty="0"/>
           </a:p>
           <a:p>
             <a:pPr lvl="1"/>
@@ -18263,7 +18298,6 @@
               <a:rPr lang="en-US" dirty="0"/>
               <a:t>or Billions of query sequences </a:t>
             </a:r>
-            <a:endParaRPr lang="en-US" dirty="0"/>
           </a:p>
           <a:p>
             <a:endParaRPr lang="en-US" dirty="0"/>
@@ -18285,7 +18319,11 @@
           <a:bodyPr/>
           <a:lstStyle/>
           <a:p>
-            <a:endParaRPr lang="en-US"/>
+            <a:r>
+              <a:rPr lang="en-US" dirty="0" smtClean="0"/>
+              <a:t>High throughput mapping</a:t>
+            </a:r>
+            <a:endParaRPr lang="en-US" dirty="0"/>
           </a:p>
         </p:txBody>
       </p:sp>
@@ -18336,37 +18374,40 @@
           <a:p>
             <a:r>
               <a:rPr lang="en-US" dirty="0"/>
-              <a:t>Placing reads in regions that do not exist in the reference genome (reads extend off the end) [ mitochondrial, plasmids, etc.]. </a:t>
-            </a:r>
-            <a:endParaRPr lang="en-US" dirty="0"/>
+              <a:t>Placing reads in regions that do not exist in the reference genome (reads extend off the end) [ mitochondrial, plasmids</a:t>
+            </a:r>
+            <a:r>
+              <a:rPr lang="en-US" dirty="0" smtClean="0"/>
+              <a:t>, structural variants, </a:t>
+            </a:r>
+            <a:r>
+              <a:rPr lang="en-US" dirty="0"/>
+              <a:t>etc.]. </a:t>
+            </a:r>
           </a:p>
           <a:p>
             <a:r>
               <a:rPr lang="en-US" dirty="0"/>
               <a:t>Sequencing errors and variations: alignment between read and true source in genome may have more differences than alignment with some other copy of repeat. </a:t>
             </a:r>
-            <a:endParaRPr lang="en-US" dirty="0"/>
           </a:p>
           <a:p>
             <a:r>
               <a:rPr lang="en-US" dirty="0"/>
               <a:t>What if the closest fully sequenced genome is too divergent? (3% is a common alignment capability) </a:t>
             </a:r>
-            <a:endParaRPr lang="en-US" dirty="0"/>
           </a:p>
           <a:p>
             <a:r>
               <a:rPr lang="en-US" dirty="0"/>
               <a:t>Placing reads in repetitive regions: Some algorithms only return 1 mapping; If multiple: map quality = 0 </a:t>
             </a:r>
-            <a:endParaRPr lang="en-US" dirty="0"/>
           </a:p>
           <a:p>
             <a:r>
               <a:rPr lang="en-US" dirty="0"/>
               <a:t>Algorithms that use paired-end information =&gt; might prefer correct distance over correct alignment. </a:t>
             </a:r>
-            <a:endParaRPr lang="en-US" dirty="0"/>
           </a:p>
           <a:p>
             <a:endParaRPr lang="en-US" dirty="0"/>
@@ -18461,7 +18502,6 @@
               <a:rPr lang="en-US" dirty="0"/>
               <a:t>junctions, reads may span an intron </a:t>
             </a:r>
-            <a:endParaRPr lang="en-US" dirty="0"/>
           </a:p>
         </p:txBody>
       </p:sp>
@@ -18550,34 +18590,7 @@
       </p:grpSpPr>
       <p:sp>
         <p:nvSpPr>
-          <p:cNvPr id="3" name="Title 2"/>
-          <p:cNvSpPr>
-            <a:spLocks noGrp="1"/>
-          </p:cNvSpPr>
-          <p:nvPr>
-            <p:ph type="title"/>
-          </p:nvPr>
-        </p:nvSpPr>
-        <p:spPr/>
-        <p:txBody>
-          <a:bodyPr/>
-          <a:lstStyle/>
-          <a:p>
-            <a:r>
-              <a:rPr lang="en-US" dirty="0" err="1" smtClean="0"/>
-              <a:t>expHts</a:t>
-            </a:r>
-            <a:r>
-              <a:rPr lang="en-US" dirty="0" smtClean="0"/>
-              <a:t> Mapping</a:t>
-            </a:r>
-            <a:endParaRPr lang="en-US" dirty="0"/>
-          </a:p>
-        </p:txBody>
-      </p:sp>
-      <p:sp>
-        <p:nvSpPr>
-          <p:cNvPr id="5" name="Content Placeholder 4"/>
+          <p:cNvPr id="2" name="Content Placeholder 1"/>
           <p:cNvSpPr>
             <a:spLocks noGrp="1"/>
           </p:cNvSpPr>
@@ -18593,112 +18606,159 @@
           <a:lstStyle/>
           <a:p>
             <a:r>
-              <a:rPr lang="en-US" dirty="0" smtClean="0"/>
-              <a:t>To run mapping across all your samples using the cleaned </a:t>
-            </a:r>
+              <a:rPr lang="en-US" dirty="0"/>
+              <a:t>Spliced Aligners </a:t>
+            </a:r>
+            <a:endParaRPr lang="en-US" dirty="0" smtClean="0"/>
+          </a:p>
+          <a:p>
+            <a:pPr lvl="1"/>
             <a:r>
               <a:rPr lang="en-US" dirty="0" err="1" smtClean="0"/>
-              <a:t>fastq</a:t>
-            </a:r>
-            <a:r>
-              <a:rPr lang="en-US" dirty="0" smtClean="0"/>
-              <a:t> files created with </a:t>
-            </a:r>
+              <a:t>Tophat</a:t>
+            </a:r>
+            <a:r>
+              <a:rPr lang="en-US" dirty="0" smtClean="0"/>
+              <a:t> </a:t>
+            </a:r>
+            <a:r>
+              <a:rPr lang="en-US" dirty="0"/>
+              <a:t>(Bowtie2) </a:t>
+            </a:r>
+          </a:p>
+          <a:p>
+            <a:pPr lvl="1"/>
+            <a:r>
+              <a:rPr lang="en-US" dirty="0"/>
+              <a:t>GSNAP </a:t>
+            </a:r>
+            <a:endParaRPr lang="en-US" dirty="0" smtClean="0"/>
+          </a:p>
+          <a:p>
+            <a:pPr lvl="1"/>
             <a:r>
               <a:rPr lang="en-US" dirty="0" err="1" smtClean="0"/>
-              <a:t>expHTS</a:t>
-            </a:r>
-            <a:r>
-              <a:rPr lang="en-US" dirty="0" smtClean="0"/>
-              <a:t> preprocess, use </a:t>
-            </a:r>
-            <a:r>
-              <a:rPr lang="en-US" dirty="0" err="1" smtClean="0">
-                <a:solidFill>
-                  <a:srgbClr val="FF0000"/>
-                </a:solidFill>
-              </a:rPr>
-              <a:t>expHTS</a:t>
-            </a:r>
-            <a:r>
-              <a:rPr lang="en-US" dirty="0" smtClean="0">
-                <a:solidFill>
-                  <a:srgbClr val="FF0000"/>
-                </a:solidFill>
-              </a:rPr>
-              <a:t> mapping</a:t>
-            </a:r>
-            <a:r>
-              <a:rPr lang="en-US" dirty="0" smtClean="0"/>
-              <a:t>.</a:t>
-            </a:r>
-          </a:p>
-          <a:p>
-            <a:r>
-              <a:rPr lang="en-US" dirty="0" smtClean="0"/>
-              <a:t>Parameter considerations (for RNA-</a:t>
-            </a:r>
+              <a:t>SOAPsplice</a:t>
+            </a:r>
+            <a:endParaRPr lang="en-US" dirty="0"/>
+          </a:p>
+          <a:p>
+            <a:pPr lvl="1"/>
             <a:r>
               <a:rPr lang="en-US" dirty="0" err="1" smtClean="0"/>
-              <a:t>seq</a:t>
-            </a:r>
-            <a:r>
-              <a:rPr lang="en-US" dirty="0" smtClean="0"/>
-              <a:t>):</a:t>
-            </a:r>
-          </a:p>
-          <a:p>
-            <a:pPr lvl="1"/>
-            <a:r>
-              <a:rPr lang="en-US" dirty="0" smtClean="0"/>
-              <a:t>Sort by Read ID (</a:t>
-            </a:r>
-            <a:r>
-              <a:rPr lang="en-US" dirty="0"/>
-              <a:t>-n, --</a:t>
-            </a:r>
+              <a:t>MapSplice</a:t>
+            </a:r>
+            <a:endParaRPr lang="en-US" dirty="0"/>
+          </a:p>
+          <a:p>
+            <a:pPr lvl="1"/>
+            <a:r>
+              <a:rPr lang="en-US" dirty="0" err="1" smtClean="0"/>
+              <a:t>TrueSite</a:t>
+            </a:r>
+            <a:endParaRPr lang="en-US" dirty="0"/>
+          </a:p>
+          <a:p>
+            <a:pPr lvl="1"/>
+            <a:r>
+              <a:rPr lang="en-US" dirty="0" err="1" smtClean="0"/>
+              <a:t>rna</a:t>
+            </a:r>
+            <a:r>
+              <a:rPr lang="en-US" dirty="0"/>
+              <a:t>-star </a:t>
+            </a:r>
+          </a:p>
+          <a:p>
+            <a:r>
+              <a:rPr lang="en-US" dirty="0"/>
+              <a:t>Aligners that can ’clip’ </a:t>
+            </a:r>
+            <a:endParaRPr lang="en-US" dirty="0" smtClean="0"/>
+          </a:p>
+          <a:p>
+            <a:pPr lvl="1"/>
+            <a:r>
+              <a:rPr lang="en-US" dirty="0" smtClean="0"/>
+              <a:t>bowtie2</a:t>
+            </a:r>
+            <a:r>
+              <a:rPr lang="en-US" dirty="0"/>
+              <a:t>-local </a:t>
+            </a:r>
+          </a:p>
+          <a:p>
+            <a:pPr lvl="1"/>
             <a:r>
               <a:rPr lang="en-US" dirty="0" err="1"/>
-              <a:t>sortByReadID</a:t>
-            </a:r>
-            <a:r>
-              <a:rPr lang="en-US" dirty="0" smtClean="0"/>
-              <a:t>): turns on bam resorting by read id instead of position, for compatibility with </a:t>
-            </a:r>
-            <a:r>
-              <a:rPr lang="en-US" dirty="0" err="1" smtClean="0"/>
-              <a:t>htseq</a:t>
-            </a:r>
-            <a:r>
-              <a:rPr lang="en-US" dirty="0" smtClean="0"/>
-              <a:t>-count (NOW PERFORMED IN HTSEQ, no longer needed) </a:t>
-            </a:r>
-          </a:p>
-          <a:p>
-            <a:pPr lvl="1"/>
-            <a:r>
-              <a:rPr lang="en-US" dirty="0" smtClean="0"/>
-              <a:t>Ignore singles (-</a:t>
-            </a:r>
-            <a:r>
-              <a:rPr lang="en-US" dirty="0"/>
-              <a:t>s, --</a:t>
-            </a:r>
-            <a:r>
-              <a:rPr lang="en-US" dirty="0" err="1" smtClean="0"/>
-              <a:t>ignoreSingles</a:t>
-            </a:r>
-            <a:r>
-              <a:rPr lang="en-US" dirty="0" smtClean="0"/>
-              <a:t>): Ignore all SE read files present in the cleaned folder, for comparability with </a:t>
-            </a:r>
-            <a:r>
-              <a:rPr lang="en-US" dirty="0" err="1" smtClean="0"/>
-              <a:t>htseq</a:t>
-            </a:r>
-            <a:r>
-              <a:rPr lang="en-US" dirty="0" smtClean="0"/>
-              <a:t>-count. While there shouldn’t be any, since we turned off overlapping of reads, this parameters makes ‘sure’ they aren’t included.</a:t>
+              <a:t>bwa-mem</a:t>
+            </a:r>
+            <a:r>
+              <a:rPr lang="en-US" dirty="0"/>
+              <a:t> </a:t>
+            </a:r>
+          </a:p>
+          <a:p>
+            <a:pPr lvl="1"/>
+            <a:endParaRPr lang="en-US" dirty="0" smtClean="0"/>
+          </a:p>
+          <a:p>
+            <a:r>
+              <a:rPr lang="en-US" dirty="0" smtClean="0"/>
+              <a:t>http</a:t>
+            </a:r>
+            <a:r>
+              <a:rPr lang="en-US" dirty="0"/>
+              <a:t>://</a:t>
+            </a:r>
+            <a:r>
+              <a:rPr lang="en-US" dirty="0" err="1"/>
+              <a:t>en.wikipedia.org</a:t>
+            </a:r>
+            <a:r>
+              <a:rPr lang="en-US" dirty="0"/>
+              <a:t>/wiki/</a:t>
+            </a:r>
+            <a:r>
+              <a:rPr lang="en-US" dirty="0" err="1"/>
+              <a:t>List_of_sequence</a:t>
+            </a:r>
+            <a:r>
+              <a:rPr lang="en-US" dirty="0"/>
+              <a:t>_ </a:t>
+            </a:r>
+            <a:r>
+              <a:rPr lang="en-US" dirty="0" err="1"/>
+              <a:t>alignment_software</a:t>
+            </a:r>
+            <a:r>
+              <a:rPr lang="en-US" dirty="0"/>
+              <a:t> </a:t>
+            </a:r>
+          </a:p>
+          <a:p>
+            <a:endParaRPr lang="en-US" dirty="0"/>
+          </a:p>
+        </p:txBody>
+      </p:sp>
+      <p:sp>
+        <p:nvSpPr>
+          <p:cNvPr id="3" name="Title 2"/>
+          <p:cNvSpPr>
+            <a:spLocks noGrp="1"/>
+          </p:cNvSpPr>
+          <p:nvPr>
+            <p:ph type="title"/>
+          </p:nvPr>
+        </p:nvSpPr>
+        <p:spPr/>
+        <p:txBody>
+          <a:bodyPr/>
+          <a:lstStyle/>
+          <a:p>
+            <a:r>
+              <a:rPr lang="en-US" dirty="0" smtClean="0"/>
+              <a:t>Some Aligners</a:t>
             </a:r>
             <a:endParaRPr lang="en-US" dirty="0"/>
           </a:p>
@@ -18707,7 +18767,7 @@
     </p:spTree>
     <p:extLst>
       <p:ext uri="{BB962C8B-B14F-4D97-AF65-F5344CB8AC3E}">
-        <p14:creationId xmlns:p14="http://schemas.microsoft.com/office/powerpoint/2010/main" val="2164109377"/>
+        <p14:creationId xmlns:p14="http://schemas.microsoft.com/office/powerpoint/2010/main" val="2434564804"/>
       </p:ext>
     </p:extLst>
   </p:cSld>
@@ -18736,7 +18796,34 @@
       </p:grpSpPr>
       <p:sp>
         <p:nvSpPr>
-          <p:cNvPr id="2" name="Content Placeholder 1"/>
+          <p:cNvPr id="3" name="Title 2"/>
+          <p:cNvSpPr>
+            <a:spLocks noGrp="1"/>
+          </p:cNvSpPr>
+          <p:nvPr>
+            <p:ph type="title"/>
+          </p:nvPr>
+        </p:nvSpPr>
+        <p:spPr/>
+        <p:txBody>
+          <a:bodyPr/>
+          <a:lstStyle/>
+          <a:p>
+            <a:r>
+              <a:rPr lang="en-US" dirty="0" err="1" smtClean="0"/>
+              <a:t>expHts</a:t>
+            </a:r>
+            <a:r>
+              <a:rPr lang="en-US" dirty="0" smtClean="0"/>
+              <a:t> Mapping</a:t>
+            </a:r>
+            <a:endParaRPr lang="en-US" dirty="0"/>
+          </a:p>
+        </p:txBody>
+      </p:sp>
+      <p:sp>
+        <p:nvSpPr>
+          <p:cNvPr id="5" name="Content Placeholder 4"/>
           <p:cNvSpPr>
             <a:spLocks noGrp="1"/>
           </p:cNvSpPr>
@@ -18752,164 +18839,112 @@
           <a:lstStyle/>
           <a:p>
             <a:r>
-              <a:rPr lang="en-US" dirty="0"/>
-              <a:t>Spliced Aligners </a:t>
-            </a:r>
-            <a:endParaRPr lang="en-US" dirty="0" smtClean="0"/>
-          </a:p>
-          <a:p>
-            <a:pPr lvl="1"/>
+              <a:rPr lang="en-US" dirty="0" smtClean="0"/>
+              <a:t>To run mapping across all your samples using the cleaned </a:t>
+            </a:r>
             <a:r>
               <a:rPr lang="en-US" dirty="0" err="1" smtClean="0"/>
-              <a:t>Tophat</a:t>
-            </a:r>
-            <a:r>
-              <a:rPr lang="en-US" dirty="0" smtClean="0"/>
-              <a:t> </a:t>
-            </a:r>
-            <a:r>
-              <a:rPr lang="en-US" dirty="0"/>
-              <a:t>(Bowtie2) </a:t>
-            </a:r>
-            <a:endParaRPr lang="en-US" dirty="0"/>
-          </a:p>
-          <a:p>
-            <a:pPr lvl="1"/>
-            <a:r>
-              <a:rPr lang="en-US" dirty="0"/>
-              <a:t>GSNAP </a:t>
-            </a:r>
-            <a:endParaRPr lang="en-US" dirty="0" smtClean="0"/>
-          </a:p>
-          <a:p>
-            <a:pPr lvl="1"/>
+              <a:t>fastq</a:t>
+            </a:r>
+            <a:r>
+              <a:rPr lang="en-US" dirty="0" smtClean="0"/>
+              <a:t> files created with </a:t>
+            </a:r>
             <a:r>
               <a:rPr lang="en-US" dirty="0" err="1" smtClean="0"/>
-              <a:t>SOAPsplice</a:t>
-            </a:r>
-            <a:endParaRPr lang="en-US" dirty="0"/>
-          </a:p>
-          <a:p>
-            <a:pPr lvl="1"/>
+              <a:t>expHTS</a:t>
+            </a:r>
+            <a:r>
+              <a:rPr lang="en-US" dirty="0" smtClean="0"/>
+              <a:t> preprocess, use </a:t>
+            </a:r>
+            <a:r>
+              <a:rPr lang="en-US" dirty="0" err="1" smtClean="0">
+                <a:solidFill>
+                  <a:srgbClr val="FF0000"/>
+                </a:solidFill>
+              </a:rPr>
+              <a:t>expHTS</a:t>
+            </a:r>
+            <a:r>
+              <a:rPr lang="en-US" dirty="0" smtClean="0">
+                <a:solidFill>
+                  <a:srgbClr val="FF0000"/>
+                </a:solidFill>
+              </a:rPr>
+              <a:t> mapping</a:t>
+            </a:r>
+            <a:r>
+              <a:rPr lang="en-US" dirty="0" smtClean="0"/>
+              <a:t>.</a:t>
+            </a:r>
+          </a:p>
+          <a:p>
+            <a:r>
+              <a:rPr lang="en-US" dirty="0" smtClean="0"/>
+              <a:t>Parameter considerations (for RNA-</a:t>
+            </a:r>
             <a:r>
               <a:rPr lang="en-US" dirty="0" err="1" smtClean="0"/>
-              <a:t>MapSplice</a:t>
-            </a:r>
-            <a:endParaRPr lang="en-US" dirty="0"/>
-          </a:p>
-          <a:p>
-            <a:pPr lvl="1"/>
+              <a:t>seq</a:t>
+            </a:r>
+            <a:r>
+              <a:rPr lang="en-US" dirty="0" smtClean="0"/>
+              <a:t>):</a:t>
+            </a:r>
+          </a:p>
+          <a:p>
+            <a:pPr lvl="1"/>
+            <a:r>
+              <a:rPr lang="en-US" dirty="0" smtClean="0"/>
+              <a:t>Sort by Read ID (</a:t>
+            </a:r>
+            <a:r>
+              <a:rPr lang="en-US" dirty="0"/>
+              <a:t>-n, --</a:t>
+            </a:r>
+            <a:r>
+              <a:rPr lang="en-US" dirty="0" err="1"/>
+              <a:t>sortByReadID</a:t>
+            </a:r>
+            <a:r>
+              <a:rPr lang="en-US" dirty="0" smtClean="0"/>
+              <a:t>): turns on bam resorting by read id instead of position, for compatibility with </a:t>
+            </a:r>
             <a:r>
               <a:rPr lang="en-US" dirty="0" err="1" smtClean="0"/>
-              <a:t>TrueSite</a:t>
-            </a:r>
-            <a:endParaRPr lang="en-US" dirty="0"/>
-          </a:p>
-          <a:p>
-            <a:pPr lvl="1"/>
+              <a:t>htseq</a:t>
+            </a:r>
+            <a:r>
+              <a:rPr lang="en-US" dirty="0" smtClean="0"/>
+              <a:t>-count (NOW PERFORMED IN HTSEQ, no longer needed) </a:t>
+            </a:r>
+          </a:p>
+          <a:p>
+            <a:pPr lvl="1"/>
+            <a:r>
+              <a:rPr lang="en-US" dirty="0" smtClean="0"/>
+              <a:t>Ignore singles (-</a:t>
+            </a:r>
+            <a:r>
+              <a:rPr lang="en-US" dirty="0"/>
+              <a:t>s, --</a:t>
+            </a:r>
             <a:r>
               <a:rPr lang="en-US" dirty="0" err="1" smtClean="0"/>
-              <a:t>rna</a:t>
-            </a:r>
-            <a:r>
-              <a:rPr lang="en-US" dirty="0"/>
-              <a:t>-star </a:t>
-            </a:r>
-            <a:endParaRPr lang="en-US" dirty="0"/>
-          </a:p>
-          <a:p>
-            <a:r>
-              <a:rPr lang="en-US" dirty="0"/>
-              <a:t>Aligners that can ’clip’ </a:t>
-            </a:r>
-            <a:endParaRPr lang="en-US" dirty="0" smtClean="0"/>
-          </a:p>
-          <a:p>
-            <a:pPr lvl="1"/>
-            <a:r>
-              <a:rPr lang="en-US" dirty="0" smtClean="0"/>
-              <a:t>bowtie2</a:t>
-            </a:r>
-            <a:r>
-              <a:rPr lang="en-US" dirty="0"/>
-              <a:t>-local </a:t>
-            </a:r>
-            <a:endParaRPr lang="en-US" dirty="0"/>
-          </a:p>
-          <a:p>
-            <a:pPr lvl="1"/>
-            <a:r>
-              <a:rPr lang="en-US" dirty="0" err="1"/>
-              <a:t>bwa-mem</a:t>
-            </a:r>
-            <a:r>
-              <a:rPr lang="en-US" dirty="0"/>
-              <a:t> </a:t>
-            </a:r>
-            <a:endParaRPr lang="en-US" dirty="0"/>
-          </a:p>
-          <a:p>
-            <a:pPr lvl="1"/>
-            <a:endParaRPr lang="en-US" dirty="0" smtClean="0"/>
-          </a:p>
-          <a:p>
-            <a:r>
-              <a:rPr lang="en-US" dirty="0" smtClean="0"/>
-              <a:t>http</a:t>
-            </a:r>
-            <a:r>
-              <a:rPr lang="en-US" dirty="0"/>
-              <a:t>://</a:t>
-            </a:r>
-            <a:r>
-              <a:rPr lang="en-US" dirty="0" err="1"/>
-              <a:t>en.wikipedia.org</a:t>
-            </a:r>
-            <a:r>
-              <a:rPr lang="en-US" dirty="0"/>
-              <a:t>/wiki/</a:t>
-            </a:r>
-            <a:r>
-              <a:rPr lang="en-US" dirty="0" err="1"/>
-              <a:t>List_of_sequence</a:t>
-            </a:r>
-            <a:r>
-              <a:rPr lang="en-US" dirty="0"/>
-              <a:t>_ </a:t>
-            </a:r>
-            <a:r>
-              <a:rPr lang="en-US" dirty="0" err="1"/>
-              <a:t>alignment_software</a:t>
-            </a:r>
-            <a:r>
-              <a:rPr lang="en-US" dirty="0"/>
-              <a:t> </a:t>
-            </a:r>
-            <a:endParaRPr lang="en-US" dirty="0"/>
-          </a:p>
-          <a:p>
-            <a:endParaRPr lang="en-US" dirty="0"/>
-          </a:p>
-        </p:txBody>
-      </p:sp>
-      <p:sp>
-        <p:nvSpPr>
-          <p:cNvPr id="3" name="Title 2"/>
-          <p:cNvSpPr>
-            <a:spLocks noGrp="1"/>
-          </p:cNvSpPr>
-          <p:nvPr>
-            <p:ph type="title"/>
-          </p:nvPr>
-        </p:nvSpPr>
-        <p:spPr/>
-        <p:txBody>
-          <a:bodyPr/>
-          <a:lstStyle/>
-          <a:p>
-            <a:r>
-              <a:rPr lang="en-US" dirty="0" smtClean="0"/>
-              <a:t>Some Aligners</a:t>
+              <a:t>ignoreSingles</a:t>
+            </a:r>
+            <a:r>
+              <a:rPr lang="en-US" dirty="0" smtClean="0"/>
+              <a:t>): Ignore all SE read files present in the cleaned folder, for comparability with </a:t>
+            </a:r>
+            <a:r>
+              <a:rPr lang="en-US" dirty="0" err="1" smtClean="0"/>
+              <a:t>htseq</a:t>
+            </a:r>
+            <a:r>
+              <a:rPr lang="en-US" dirty="0" smtClean="0"/>
+              <a:t>-count. While there shouldn’t be any, since we turned off overlapping of reads, this parameters makes ‘sure’ they aren’t included.</a:t>
             </a:r>
             <a:endParaRPr lang="en-US" dirty="0"/>
           </a:p>
@@ -18918,7 +18953,7 @@
     </p:spTree>
     <p:extLst>
       <p:ext uri="{BB962C8B-B14F-4D97-AF65-F5344CB8AC3E}">
-        <p14:creationId xmlns:p14="http://schemas.microsoft.com/office/powerpoint/2010/main" val="2434564804"/>
+        <p14:creationId xmlns:p14="http://schemas.microsoft.com/office/powerpoint/2010/main" val="2164109377"/>
       </p:ext>
     </p:extLst>
   </p:cSld>
@@ -19261,7 +19296,6 @@
               <a:rPr lang="en-US" dirty="0"/>
               <a:t>8</a:t>
             </a:r>
-            <a:endParaRPr lang="en-US" dirty="0"/>
           </a:p>
         </p:txBody>
       </p:sp>
@@ -20525,11 +20559,7 @@
           <a:p>
             <a:r>
               <a:rPr lang="en-US" dirty="0" smtClean="0"/>
-              <a:t>Section </a:t>
-            </a:r>
-            <a:r>
-              <a:rPr lang="en-US" dirty="0" smtClean="0"/>
-              <a:t>9</a:t>
+              <a:t>Section 9</a:t>
             </a:r>
             <a:endParaRPr lang="en-US" dirty="0"/>
           </a:p>
@@ -20610,81 +20640,183 @@
             <p:ph idx="1"/>
           </p:nvPr>
         </p:nvSpPr>
+        <p:spPr>
+          <a:xfrm>
+            <a:off x="380999" y="1719071"/>
+            <a:ext cx="8407893" cy="4751245"/>
+          </a:xfrm>
+        </p:spPr>
+        <p:txBody>
+          <a:bodyPr>
+            <a:normAutofit/>
+          </a:bodyPr>
+          <a:lstStyle/>
+          <a:p>
+            <a:r>
+              <a:rPr lang="en-US" dirty="0"/>
+              <a:t>Differential Expression between </a:t>
+            </a:r>
+            <a:r>
+              <a:rPr lang="en-US" dirty="0" smtClean="0"/>
+              <a:t>conditions is determined from count data, which is modeled </a:t>
+            </a:r>
+            <a:r>
+              <a:rPr lang="en-US" dirty="0"/>
+              <a:t>by a distribution (</a:t>
+            </a:r>
+            <a:r>
+              <a:rPr lang="en-US" dirty="0" err="1"/>
+              <a:t>ie</a:t>
+            </a:r>
+            <a:r>
+              <a:rPr lang="en-US" dirty="0"/>
+              <a:t>. Negative Binomial Distribution, Poisson, etc.) </a:t>
+            </a:r>
+          </a:p>
+          <a:p>
+            <a:r>
+              <a:rPr lang="en-US" dirty="0" smtClean="0"/>
+              <a:t>Generally </a:t>
+            </a:r>
+            <a:r>
+              <a:rPr lang="en-US" dirty="0"/>
+              <a:t>speaking differential expression analysis is performed in a very similar manner to DNA microarrays, once bias and normalization have been performed. </a:t>
+            </a:r>
+            <a:endParaRPr lang="en-US" dirty="0" smtClean="0"/>
+          </a:p>
+          <a:p>
+            <a:r>
+              <a:rPr lang="en-US" dirty="0" smtClean="0"/>
+              <a:t>A </a:t>
+            </a:r>
+            <a:r>
+              <a:rPr lang="en-US" dirty="0"/>
+              <a:t>lot of RNA-</a:t>
+            </a:r>
+            <a:r>
+              <a:rPr lang="en-US" dirty="0" err="1"/>
+              <a:t>seq</a:t>
+            </a:r>
+            <a:r>
+              <a:rPr lang="en-US" dirty="0"/>
+              <a:t> analysis has been done in R and so there are many packages available to analyze and view this data. Two of the best are: </a:t>
+            </a:r>
+            <a:endParaRPr lang="en-US" dirty="0"/>
+          </a:p>
+          <a:p>
+            <a:pPr lvl="1"/>
+            <a:r>
+              <a:rPr lang="en-US" dirty="0" err="1" smtClean="0"/>
+              <a:t>DESeq</a:t>
+            </a:r>
+            <a:r>
+              <a:rPr lang="en-US" dirty="0" smtClean="0"/>
+              <a:t>, developed by Simon Anders (also created </a:t>
+            </a:r>
+            <a:r>
+              <a:rPr lang="en-US" dirty="0" err="1" smtClean="0"/>
+              <a:t>htseq</a:t>
+            </a:r>
+            <a:r>
+              <a:rPr lang="en-US" smtClean="0"/>
+              <a:t>) </a:t>
+            </a:r>
+            <a:r>
+              <a:rPr lang="en-US" dirty="0" smtClean="0"/>
+              <a:t>in Wolfgang Huber’s group at EMBL</a:t>
+            </a:r>
+          </a:p>
+          <a:p>
+            <a:pPr lvl="1"/>
+            <a:r>
+              <a:rPr lang="en-US" dirty="0" err="1" smtClean="0"/>
+              <a:t>edgeR</a:t>
+            </a:r>
+            <a:r>
+              <a:rPr lang="en-US" dirty="0" smtClean="0"/>
+              <a:t> </a:t>
+            </a:r>
+            <a:r>
+              <a:rPr lang="en-US" dirty="0"/>
+              <a:t>(extension to </a:t>
+            </a:r>
+            <a:r>
+              <a:rPr lang="en-US" dirty="0" err="1"/>
+              <a:t>Limma</a:t>
+            </a:r>
+            <a:r>
+              <a:rPr lang="en-US" dirty="0"/>
+              <a:t> [microarrays] for RNA-</a:t>
+            </a:r>
+            <a:r>
+              <a:rPr lang="en-US" dirty="0" err="1"/>
+              <a:t>seq</a:t>
+            </a:r>
+            <a:r>
+              <a:rPr lang="en-US" dirty="0" smtClean="0"/>
+              <a:t>), developed out of </a:t>
+            </a:r>
+            <a:r>
+              <a:rPr lang="en-US" dirty="0"/>
+              <a:t>Gordon </a:t>
+            </a:r>
+            <a:r>
+              <a:rPr lang="en-US" dirty="0" smtClean="0"/>
+              <a:t>Smyth’s group from the </a:t>
+            </a:r>
+            <a:r>
+              <a:rPr lang="en-US" dirty="0"/>
+              <a:t>Walter and Eliza Hall Institute of Medical </a:t>
+            </a:r>
+            <a:r>
+              <a:rPr lang="en-US" dirty="0" smtClean="0"/>
+              <a:t>Research in Australia</a:t>
+            </a:r>
+          </a:p>
+          <a:p>
+            <a:pPr lvl="1"/>
+            <a:r>
+              <a:rPr lang="en-US" sz="1600" dirty="0" smtClean="0"/>
+              <a:t>http</a:t>
+            </a:r>
+            <a:r>
+              <a:rPr lang="en-US" sz="1600" dirty="0"/>
+              <a:t>://</a:t>
+            </a:r>
+            <a:r>
+              <a:rPr lang="en-US" sz="1600" dirty="0" err="1"/>
+              <a:t>bioconductor.org</a:t>
+            </a:r>
+            <a:r>
+              <a:rPr lang="en-US" sz="1600" dirty="0"/>
+              <a:t>/packages/release/BiocViews.html#___</a:t>
+            </a:r>
+            <a:r>
+              <a:rPr lang="en-US" sz="1600" dirty="0" err="1"/>
+              <a:t>RNASeq</a:t>
+            </a:r>
+            <a:endParaRPr lang="en-US" sz="1600" dirty="0"/>
+          </a:p>
+        </p:txBody>
+      </p:sp>
+      <p:sp>
+        <p:nvSpPr>
+          <p:cNvPr id="3" name="Title 2"/>
+          <p:cNvSpPr>
+            <a:spLocks noGrp="1"/>
+          </p:cNvSpPr>
+          <p:nvPr>
+            <p:ph type="title"/>
+          </p:nvPr>
+        </p:nvSpPr>
         <p:spPr/>
         <p:txBody>
           <a:bodyPr/>
           <a:lstStyle/>
           <a:p>
-            <a:pPr marL="45720" indent="0">
-              <a:buNone/>
-            </a:pPr>
-            <a:r>
-              <a:rPr lang="en-US" dirty="0" smtClean="0"/>
-              <a:t>Perform</a:t>
-            </a:r>
-            <a:endParaRPr lang="en-US" dirty="0"/>
-          </a:p>
-        </p:txBody>
-      </p:sp>
-      <p:sp>
-        <p:nvSpPr>
-          <p:cNvPr id="3" name="Text Placeholder 2"/>
-          <p:cNvSpPr>
-            <a:spLocks noGrp="1"/>
-          </p:cNvSpPr>
-          <p:nvPr>
-            <p:ph type="body" sz="half" idx="2"/>
-          </p:nvPr>
-        </p:nvSpPr>
-        <p:spPr/>
-        <p:txBody>
-          <a:bodyPr/>
-          <a:lstStyle/>
-          <a:p>
             <a:r>
               <a:rPr lang="en-US" dirty="0" smtClean="0"/>
               <a:t>Differential Expression Analysis</a:t>
-            </a:r>
-            <a:endParaRPr lang="en-US" dirty="0"/>
-          </a:p>
-        </p:txBody>
-      </p:sp>
-      <p:sp>
-        <p:nvSpPr>
-          <p:cNvPr id="4" name="Title 3"/>
-          <p:cNvSpPr>
-            <a:spLocks noGrp="1"/>
-          </p:cNvSpPr>
-          <p:nvPr>
-            <p:ph type="title"/>
-          </p:nvPr>
-        </p:nvSpPr>
-        <p:spPr/>
-        <p:txBody>
-          <a:bodyPr/>
-          <a:lstStyle/>
-          <a:p>
-            <a:r>
-              <a:rPr lang="en-US" dirty="0" err="1"/>
-              <a:t>WoRK</a:t>
-            </a:r>
-            <a:r>
-              <a:rPr lang="en-US" dirty="0"/>
-              <a:t/>
-            </a:r>
-            <a:br>
-              <a:rPr lang="en-US" dirty="0"/>
-            </a:br>
-            <a:r>
-              <a:rPr lang="en-US" dirty="0"/>
-              <a:t>Session</a:t>
-            </a:r>
-            <a:br>
-              <a:rPr lang="en-US" dirty="0"/>
-            </a:br>
-            <a:r>
-              <a:rPr lang="en-US" dirty="0" smtClean="0"/>
-              <a:t>11</a:t>
             </a:r>
             <a:endParaRPr lang="en-US" dirty="0"/>
           </a:p>
@@ -20693,7 +20825,7 @@
     </p:spTree>
     <p:extLst>
       <p:ext uri="{BB962C8B-B14F-4D97-AF65-F5344CB8AC3E}">
-        <p14:creationId xmlns:p14="http://schemas.microsoft.com/office/powerpoint/2010/main" val="1466227997"/>
+        <p14:creationId xmlns:p14="http://schemas.microsoft.com/office/powerpoint/2010/main" val="2158795165"/>
       </p:ext>
     </p:extLst>
   </p:cSld>
@@ -20722,6 +20854,250 @@
       </p:grpSpPr>
       <p:sp>
         <p:nvSpPr>
+          <p:cNvPr id="2" name="Content Placeholder 1"/>
+          <p:cNvSpPr>
+            <a:spLocks noGrp="1"/>
+          </p:cNvSpPr>
+          <p:nvPr>
+            <p:ph idx="1"/>
+          </p:nvPr>
+        </p:nvSpPr>
+        <p:spPr/>
+        <p:txBody>
+          <a:bodyPr/>
+          <a:lstStyle/>
+          <a:p>
+            <a:endParaRPr lang="en-US" sz="2800" dirty="0" smtClean="0"/>
+          </a:p>
+          <a:p>
+            <a:r>
+              <a:rPr lang="en-US" sz="2800" dirty="0" smtClean="0"/>
+              <a:t>RPKM </a:t>
+            </a:r>
+            <a:r>
+              <a:rPr lang="en-US" sz="2800" dirty="0"/>
+              <a:t>- Reads per </a:t>
+            </a:r>
+            <a:r>
+              <a:rPr lang="en-US" sz="2800" dirty="0" err="1"/>
+              <a:t>kilobase</a:t>
+            </a:r>
+            <a:r>
+              <a:rPr lang="en-US" sz="2800" dirty="0"/>
+              <a:t> per million mapped reads </a:t>
+            </a:r>
+            <a:endParaRPr lang="en-US" sz="2800" dirty="0"/>
+          </a:p>
+          <a:p>
+            <a:endParaRPr lang="en-US" sz="2800" dirty="0" smtClean="0"/>
+          </a:p>
+          <a:p>
+            <a:r>
+              <a:rPr lang="en-US" sz="2800" dirty="0" smtClean="0"/>
+              <a:t>FPKM </a:t>
+            </a:r>
+            <a:r>
+              <a:rPr lang="en-US" sz="2800" dirty="0"/>
+              <a:t>- Fragments per </a:t>
+            </a:r>
+            <a:r>
+              <a:rPr lang="en-US" sz="2800" dirty="0" err="1"/>
+              <a:t>kilobase</a:t>
+            </a:r>
+            <a:r>
+              <a:rPr lang="en-US" sz="2800" dirty="0"/>
+              <a:t> per million mapped reads </a:t>
+            </a:r>
+            <a:endParaRPr lang="en-US" sz="2800" dirty="0"/>
+          </a:p>
+          <a:p>
+            <a:endParaRPr lang="en-US" dirty="0"/>
+          </a:p>
+        </p:txBody>
+      </p:sp>
+      <p:sp>
+        <p:nvSpPr>
+          <p:cNvPr id="3" name="Title 2"/>
+          <p:cNvSpPr>
+            <a:spLocks noGrp="1"/>
+          </p:cNvSpPr>
+          <p:nvPr>
+            <p:ph type="title"/>
+          </p:nvPr>
+        </p:nvSpPr>
+        <p:spPr/>
+        <p:txBody>
+          <a:bodyPr/>
+          <a:lstStyle/>
+          <a:p>
+            <a:r>
+              <a:rPr lang="en-US" dirty="0" smtClean="0"/>
+              <a:t>RPKM </a:t>
+            </a:r>
+            <a:r>
+              <a:rPr lang="en-US" dirty="0" err="1" smtClean="0"/>
+              <a:t>vs</a:t>
+            </a:r>
+            <a:r>
+              <a:rPr lang="en-US" dirty="0" smtClean="0"/>
+              <a:t> FPKM</a:t>
+            </a:r>
+            <a:endParaRPr lang="en-US" dirty="0"/>
+          </a:p>
+        </p:txBody>
+      </p:sp>
+    </p:spTree>
+    <p:extLst>
+      <p:ext uri="{BB962C8B-B14F-4D97-AF65-F5344CB8AC3E}">
+        <p14:creationId xmlns:p14="http://schemas.microsoft.com/office/powerpoint/2010/main" val="227469612"/>
+      </p:ext>
+    </p:extLst>
+  </p:cSld>
+  <p:clrMapOvr>
+    <a:masterClrMapping/>
+  </p:clrMapOvr>
+</p:sld>
+</file>
+
+<file path=ppt/slides/slide97.xml><?xml version="1.0" encoding="utf-8"?>
+<p:sld xmlns:a="http://schemas.openxmlformats.org/drawingml/2006/main" xmlns:r="http://schemas.openxmlformats.org/officeDocument/2006/relationships" xmlns:p="http://schemas.openxmlformats.org/presentationml/2006/main">
+  <p:cSld>
+    <p:spTree>
+      <p:nvGrpSpPr>
+        <p:cNvPr id="1" name=""/>
+        <p:cNvGrpSpPr/>
+        <p:nvPr/>
+      </p:nvGrpSpPr>
+      <p:grpSpPr>
+        <a:xfrm>
+          <a:off x="0" y="0"/>
+          <a:ext cx="0" cy="0"/>
+          <a:chOff x="0" y="0"/>
+          <a:chExt cx="0" cy="0"/>
+        </a:xfrm>
+      </p:grpSpPr>
+      <p:sp>
+        <p:nvSpPr>
+          <p:cNvPr id="2" name="Content Placeholder 1"/>
+          <p:cNvSpPr>
+            <a:spLocks noGrp="1"/>
+          </p:cNvSpPr>
+          <p:nvPr>
+            <p:ph idx="1"/>
+          </p:nvPr>
+        </p:nvSpPr>
+        <p:spPr/>
+        <p:txBody>
+          <a:bodyPr/>
+          <a:lstStyle/>
+          <a:p>
+            <a:pPr marL="45720" indent="0">
+              <a:buNone/>
+            </a:pPr>
+            <a:r>
+              <a:rPr lang="en-US" dirty="0" smtClean="0"/>
+              <a:t>Perform</a:t>
+            </a:r>
+            <a:endParaRPr lang="en-US" dirty="0"/>
+          </a:p>
+        </p:txBody>
+      </p:sp>
+      <p:sp>
+        <p:nvSpPr>
+          <p:cNvPr id="3" name="Text Placeholder 2"/>
+          <p:cNvSpPr>
+            <a:spLocks noGrp="1"/>
+          </p:cNvSpPr>
+          <p:nvPr>
+            <p:ph type="body" sz="half" idx="2"/>
+          </p:nvPr>
+        </p:nvSpPr>
+        <p:spPr/>
+        <p:txBody>
+          <a:bodyPr/>
+          <a:lstStyle/>
+          <a:p>
+            <a:r>
+              <a:rPr lang="en-US" dirty="0" smtClean="0"/>
+              <a:t>Differential Expression Analysis</a:t>
+            </a:r>
+            <a:endParaRPr lang="en-US" dirty="0"/>
+          </a:p>
+        </p:txBody>
+      </p:sp>
+      <p:sp>
+        <p:nvSpPr>
+          <p:cNvPr id="4" name="Title 3"/>
+          <p:cNvSpPr>
+            <a:spLocks noGrp="1"/>
+          </p:cNvSpPr>
+          <p:nvPr>
+            <p:ph type="title"/>
+          </p:nvPr>
+        </p:nvSpPr>
+        <p:spPr/>
+        <p:txBody>
+          <a:bodyPr/>
+          <a:lstStyle/>
+          <a:p>
+            <a:r>
+              <a:rPr lang="en-US" dirty="0" err="1"/>
+              <a:t>WoRK</a:t>
+            </a:r>
+            <a:r>
+              <a:rPr lang="en-US" dirty="0"/>
+              <a:t/>
+            </a:r>
+            <a:br>
+              <a:rPr lang="en-US" dirty="0"/>
+            </a:br>
+            <a:r>
+              <a:rPr lang="en-US" dirty="0"/>
+              <a:t>Session</a:t>
+            </a:r>
+            <a:br>
+              <a:rPr lang="en-US" dirty="0"/>
+            </a:br>
+            <a:r>
+              <a:rPr lang="en-US" dirty="0" smtClean="0"/>
+              <a:t>11</a:t>
+            </a:r>
+            <a:endParaRPr lang="en-US" dirty="0"/>
+          </a:p>
+        </p:txBody>
+      </p:sp>
+    </p:spTree>
+    <p:extLst>
+      <p:ext uri="{BB962C8B-B14F-4D97-AF65-F5344CB8AC3E}">
+        <p14:creationId xmlns:p14="http://schemas.microsoft.com/office/powerpoint/2010/main" val="1466227997"/>
+      </p:ext>
+    </p:extLst>
+  </p:cSld>
+  <p:clrMapOvr>
+    <a:masterClrMapping/>
+  </p:clrMapOvr>
+</p:sld>
+</file>
+
+<file path=ppt/slides/slide98.xml><?xml version="1.0" encoding="utf-8"?>
+<p:sld xmlns:a="http://schemas.openxmlformats.org/drawingml/2006/main" xmlns:r="http://schemas.openxmlformats.org/officeDocument/2006/relationships" xmlns:p="http://schemas.openxmlformats.org/presentationml/2006/main">
+  <p:cSld>
+    <p:spTree>
+      <p:nvGrpSpPr>
+        <p:cNvPr id="1" name=""/>
+        <p:cNvGrpSpPr/>
+        <p:nvPr/>
+      </p:nvGrpSpPr>
+      <p:grpSpPr>
+        <a:xfrm>
+          <a:off x="0" y="0"/>
+          <a:ext cx="0" cy="0"/>
+          <a:chOff x="0" y="0"/>
+          <a:chExt cx="0" cy="0"/>
+        </a:xfrm>
+      </p:grpSpPr>
+      <p:sp>
+        <p:nvSpPr>
           <p:cNvPr id="2" name="Text Placeholder 1"/>
           <p:cNvSpPr>
             <a:spLocks noGrp="1"/>
@@ -20737,11 +21113,7 @@
           <a:p>
             <a:r>
               <a:rPr lang="en-US" dirty="0" smtClean="0"/>
-              <a:t>Section </a:t>
-            </a:r>
-            <a:r>
-              <a:rPr lang="en-US" dirty="0" smtClean="0"/>
-              <a:t>10</a:t>
+              <a:t>Section 10</a:t>
             </a:r>
             <a:endParaRPr lang="en-US" dirty="0"/>
           </a:p>
@@ -20791,7 +21163,7 @@
 </p:sld>
 </file>
 
-<file path=ppt/slides/slide97.xml><?xml version="1.0" encoding="utf-8"?>
+<file path=ppt/slides/slide99.xml><?xml version="1.0" encoding="utf-8"?>
 <p:sld xmlns:a="http://schemas.openxmlformats.org/drawingml/2006/main" xmlns:r="http://schemas.openxmlformats.org/officeDocument/2006/relationships" xmlns:p="http://schemas.openxmlformats.org/presentationml/2006/main">
   <p:cSld>
     <p:spTree>

</xml_diff>